<commit_message>
New translations mx onboarding session slides_5 day_ux.pptx (Spanish)
</commit_message>
<xml_diff>
--- a/translations/parent_text_v2_mexico/es/es_MX Onboarding Session Slides_5 Day_UX.pptx
+++ b/translations/parent_text_v2_mexico/es/es_MX Onboarding Session Slides_5 Day_UX.pptx
@@ -949,7 +949,7 @@
               <a:buNone/>
             </a:pPr>
             <a:r>
-              <a:t>Opening slide</a:t>
+              <a:t>Diapositiva inicial</a:t>
             </a:r>
           </a:p>
         </p:txBody>
@@ -2768,7 +2768,7 @@
               <a:buNone/>
             </a:pPr>
             <a:r>
-              <a:t>There are three parts to Crianza con ConCiencia+ </a:t>
+              <a:t>Crianza con Conciencia+ consta de tres partes </a:t>
             </a:r>
           </a:p>
           <a:p>
@@ -15642,7 +15642,7 @@
               </a:defRPr>
             </a:pPr>
             <a:r>
-              <a:t>Month Year</a:t>
+              <a:t>Mes Año</a:t>
             </a:r>
             <a:endParaRPr b="0" i="0" sz="2100" u="none" cap="none" strike="noStrike">
               <a:solidFill>
@@ -15704,7 +15704,7 @@
               </a:defRPr>
             </a:pPr>
             <a:r>
-              <a:t>Onboarding Session </a:t>
+              <a:t>Sesión de Integración </a:t>
             </a:r>
             <a:endParaRPr b="1" i="0" sz="2100" u="none" cap="none" strike="noStrike">
               <a:solidFill>
@@ -15766,7 +15766,7 @@
               </a:defRPr>
             </a:pPr>
             <a:r>
-              <a:t>Name of the Facilitator</a:t>
+              <a:t>Nombre del Facilitador</a:t>
             </a:r>
             <a:endParaRPr b="0" i="0" sz="2100" u="none" cap="none" strike="noStrike">
               <a:solidFill>
@@ -16029,10 +16029,10 @@
                 <a:cs typeface="Arial"/>
                 <a:sym typeface="Arial"/>
               </a:rPr>
-              <a:t>Getting Started with </a:t>
+              <a:t>Primeros pasos para el chatbot de </a:t>
             </a:r>
             <a:r>
-              <a:t>Crianza con Conciencia+ chatbot</a:t>
+              <a:t>Crianza con Conciencia+</a:t>
             </a:r>
             <a:endParaRPr b="0" i="0" sz="1400" u="none" cap="none" strike="noStrike">
               <a:solidFill>
@@ -16100,10 +16100,10 @@
                 <a:cs typeface="Arial"/>
                 <a:sym typeface="Arial"/>
               </a:rPr>
-              <a:t>Getting into </a:t>
+              <a:t>Entrar al chatbot de </a:t>
             </a:r>
             <a:r>
-              <a:t>Crianza con Conciencia+ chatbot</a:t>
+              <a:t>Crianza con Conciencia+</a:t>
             </a:r>
             <a:endParaRPr b="0" i="0" sz="1600" u="none" cap="none" strike="noStrike">
               <a:solidFill>
@@ -16172,7 +16172,7 @@
                 <a:cs typeface="Arial"/>
                 <a:sym typeface="Arial"/>
               </a:rPr>
-              <a:t>Save the </a:t>
+              <a:t>Guarda el </a:t>
             </a:r>
             <a:r>
               <a:rPr>
@@ -16180,7 +16180,7 @@
                   <a:srgbClr val="123D5D"/>
                 </a:solidFill>
               </a:rPr>
-              <a:t>Crianza con Conciencia+ chatbot</a:t>
+              <a:t>número de teléfono de</a:t>
             </a:r>
             <a:r>
               <a:rPr>
@@ -16192,7 +16192,7 @@
                 <a:cs typeface="Arial"/>
                 <a:sym typeface="Arial"/>
               </a:rPr>
-              <a:t> phone number (</a:t>
+              <a:t> Crianza con Conciencia+ (</a:t>
             </a:r>
             <a:r>
               <a:rPr b="1">
@@ -16212,7 +16212,7 @@
                 <a:cs typeface="Arial"/>
                 <a:sym typeface="Arial"/>
               </a:rPr>
-              <a:t>) as a contact</a:t>
+              <a:t>) como contacto</a:t>
             </a:r>
             <a:endParaRPr b="0" i="0" sz="1500" u="none" cap="none" strike="noStrike">
               <a:solidFill>
@@ -16253,7 +16253,7 @@
                 <a:cs typeface="Arial"/>
                 <a:sym typeface="Arial"/>
               </a:rPr>
-              <a:t>Open WhatsApp → Search for ‘</a:t>
+              <a:t>Abre WhatsApp → Busca '</a:t>
             </a:r>
             <a:r>
               <a:rPr>
@@ -16278,7 +16278,7 @@
                 <a:cs typeface="Arial"/>
                 <a:sym typeface="Arial"/>
               </a:rPr>
-              <a:t>’ → Type </a:t>
+              <a:t>' → Escribe </a:t>
             </a:r>
             <a:r>
               <a:rPr b="1">
@@ -16298,7 +16298,7 @@
                 <a:cs typeface="Arial"/>
                 <a:sym typeface="Arial"/>
               </a:rPr>
-              <a:t> to start the chat</a:t>
+              <a:t> para iniciar el chat</a:t>
             </a:r>
             <a:endParaRPr b="0" i="0" sz="1500" u="none" cap="none" strike="noStrike">
               <a:solidFill>
@@ -16333,7 +16333,7 @@
               </a:defRPr>
             </a:pPr>
             <a:r>
-              <a:t>Type your first and last name </a:t>
+              <a:t>Escribe tu nombre y apellidos </a:t>
             </a:r>
             <a:endParaRPr sz="1500">
               <a:solidFill>
@@ -16364,7 +16364,7 @@
               </a:defRPr>
             </a:pPr>
             <a:r>
-              <a:t>Choose your gender </a:t>
+              <a:t>Escoge tu género </a:t>
             </a:r>
             <a:endParaRPr b="1" i="0" sz="1500" u="none" cap="none" strike="noStrike">
               <a:solidFill>
@@ -16516,10 +16516,10 @@
                 <a:cs typeface="Arial"/>
                 <a:sym typeface="Arial"/>
               </a:rPr>
-              <a:t>Getting Started with </a:t>
+              <a:t>Primeros pasos para el chatbot de </a:t>
             </a:r>
             <a:r>
-              <a:t>Crianza con Conciencia+ chatbot</a:t>
+              <a:t>Crianza con Conciencia+</a:t>
             </a:r>
             <a:endParaRPr b="0" i="0" sz="1400" u="none" cap="none" strike="noStrike">
               <a:solidFill>
@@ -16580,7 +16580,7 @@
               </a:defRPr>
             </a:pPr>
             <a:r>
-              <a:t>[ADD THE INTRODUCTION ONBOARDING VIDEO HERE]</a:t>
+              <a:t>[AGREGA EL VÍDEO DE INTEGRACIÓN A LA EMPRESA AQUÍ]</a:t>
             </a:r>
             <a:endParaRPr b="1" i="0" sz="1500" u="none" cap="none" strike="noStrike">
               <a:solidFill>
@@ -16732,10 +16732,10 @@
                 <a:cs typeface="Arial"/>
                 <a:sym typeface="Arial"/>
               </a:rPr>
-              <a:t>Getting Started with </a:t>
+              <a:t>Primeros pasos para el chatbot de </a:t>
             </a:r>
             <a:r>
-              <a:t>Crianza con Conciencia+ chatbot</a:t>
+              <a:t>Crianza con Conciencia+</a:t>
             </a:r>
             <a:endParaRPr b="0" i="0" sz="1400" u="none" cap="none" strike="noStrike">
               <a:solidFill>
@@ -16803,10 +16803,10 @@
                 <a:cs typeface="Arial"/>
                 <a:sym typeface="Arial"/>
               </a:rPr>
-              <a:t>Getting into </a:t>
+              <a:t>Entrar al chatbot de </a:t>
             </a:r>
             <a:r>
-              <a:t>Crianza con Conciencia+ chatbot</a:t>
+              <a:t>Crianza con Conciencia+</a:t>
             </a:r>
             <a:endParaRPr b="0" i="0" sz="1600" u="none" cap="none" strike="noStrike">
               <a:solidFill>
@@ -16869,7 +16869,7 @@
               </a:defRPr>
             </a:pPr>
             <a:r>
-              <a:t>Choose how you would like to receive the messages </a:t>
+              <a:t>Escoge cómo quieres recibir los mensajes </a:t>
             </a:r>
             <a:endParaRPr sz="1500">
               <a:solidFill>
@@ -16900,7 +16900,7 @@
               </a:defRPr>
             </a:pPr>
             <a:r>
-              <a:t>Text, Images, and Videos </a:t>
+              <a:t>Texto, Imágenes y Videos </a:t>
             </a:r>
             <a:endParaRPr sz="1500">
               <a:solidFill>
@@ -16931,7 +16931,7 @@
               </a:defRPr>
             </a:pPr>
             <a:r>
-              <a:t>Text, Images, and Audio </a:t>
+              <a:t>Texto, Imágenes y Audio </a:t>
             </a:r>
             <a:endParaRPr sz="1500">
               <a:solidFill>
@@ -16962,7 +16962,7 @@
               </a:defRPr>
             </a:pPr>
             <a:r>
-              <a:t>Text and Images Only </a:t>
+              <a:t>Solo Texto e Imágenes </a:t>
             </a:r>
             <a:endParaRPr sz="1500">
               <a:solidFill>
@@ -16993,7 +16993,7 @@
               </a:defRPr>
             </a:pPr>
             <a:r>
-              <a:t>Choose your relationship status </a:t>
+              <a:t>Escoge tu situación sentimental </a:t>
             </a:r>
             <a:endParaRPr sz="1500">
               <a:solidFill>
@@ -17024,7 +17024,7 @@
               </a:defRPr>
             </a:pPr>
             <a:r>
-              <a:t>Type your girl or boy’s name. </a:t>
+              <a:t>Escribe el nombre de tu niña o niño. </a:t>
             </a:r>
             <a:endParaRPr sz="1500">
               <a:solidFill>
@@ -17055,7 +17055,7 @@
               </a:defRPr>
             </a:pPr>
             <a:r>
-              <a:t>Girl or boy’s Gender </a:t>
+              <a:t>Género de la niña o del niño </a:t>
             </a:r>
             <a:endParaRPr sz="1500">
               <a:solidFill>
@@ -17086,7 +17086,7 @@
               </a:defRPr>
             </a:pPr>
             <a:r>
-              <a:t>Girl or boy’s date of birth </a:t>
+              <a:t>Fecha de nacimiento de la niña o del niño </a:t>
             </a:r>
             <a:endParaRPr sz="1500">
               <a:solidFill>
@@ -17234,10 +17234,10 @@
                 <a:cs typeface="Arial"/>
                 <a:sym typeface="Arial"/>
               </a:rPr>
-              <a:t>Getting Started with </a:t>
+              <a:t>Primeros pasos para el chatbot de </a:t>
             </a:r>
             <a:r>
-              <a:t>Crianza con Conciencia+ chatbot</a:t>
+              <a:t>Crianza con Conciencia+</a:t>
             </a:r>
             <a:endParaRPr b="0" i="0" sz="1400" u="none" cap="none" strike="noStrike">
               <a:solidFill>
@@ -17298,7 +17298,7 @@
               </a:defRPr>
             </a:pPr>
             <a:r>
-              <a:t>[ADD THE SELF-CARE VIDEO]</a:t>
+              <a:t>[AGREGA EL VÍDEO DE AUTOCUIDADO]</a:t>
             </a:r>
             <a:endParaRPr b="1" i="0" sz="1500" u="none" cap="none" strike="noStrike">
               <a:solidFill>
@@ -17384,7 +17384,7 @@
               </a:defRPr>
             </a:pPr>
             <a:r>
-              <a:t>Questions?</a:t>
+              <a:t>¿Tienes preguntas?</a:t>
             </a:r>
             <a:endParaRPr b="1" sz="5000">
               <a:solidFill>
@@ -17532,10 +17532,10 @@
                 <a:cs typeface="Arial"/>
                 <a:sym typeface="Arial"/>
               </a:rPr>
-              <a:t>Getting Started with </a:t>
+              <a:t>Primeros pasos para el chatbot de </a:t>
             </a:r>
             <a:r>
-              <a:t>Crianza con Conciencia+ chatbot</a:t>
+              <a:t>Crianza con Conciencia+</a:t>
             </a:r>
             <a:endParaRPr b="0" i="0" sz="1400" u="none" cap="none" strike="noStrike">
               <a:solidFill>
@@ -17592,7 +17592,7 @@
               </a:defRPr>
             </a:pPr>
             <a:r>
-              <a:t>Stuck in Crianza con Conciencia+? </a:t>
+              <a:t>¿Te atoraste en Crianza con Conciencia+? </a:t>
             </a:r>
             <a:endParaRPr b="1" sz="1600">
               <a:solidFill>
@@ -17619,7 +17619,7 @@
               </a:defRPr>
             </a:pPr>
             <a:r>
-              <a:t>If ‘SIGUIENTE’ button doesn’t appear, type SIGUIENTE in the chatbot </a:t>
+              <a:t>Si no aparece el botón "SIGUIENTE", escribe SIGUIENTE en el chatbot </a:t>
             </a:r>
             <a:endParaRPr sz="1600">
               <a:solidFill>
@@ -17667,7 +17667,7 @@
               </a:defRPr>
             </a:pPr>
             <a:r>
-              <a:t>How to access Main Menu?</a:t>
+              <a:t>¿Cómo acceder al Menú Principal?</a:t>
             </a:r>
             <a:endParaRPr b="1" sz="1600">
               <a:solidFill>
@@ -17691,7 +17691,7 @@
               </a:defRPr>
             </a:pPr>
             <a:r>
-              <a:t>To access Main Menu, type MENU anytime.</a:t>
+              <a:t>Para tener acceso al Menú Principal en cualquier momento, escribe y manda la palabra MENÚ.</a:t>
             </a:r>
             <a:endParaRPr sz="1600">
               <a:solidFill>
@@ -17715,7 +17715,7 @@
               </a:defRPr>
             </a:pPr>
             <a:r>
-              <a:t>Explore options like tracking progress, adjusting settings, rewatching onboarding, or seeking navigation tips.</a:t>
+              <a:t>Explora las opciones disponibles como seguir el progreso, ajustar la configuración, volver revisar la sesión de integración o buscar tips de navegación.</a:t>
             </a:r>
             <a:endParaRPr sz="1600">
               <a:solidFill>
@@ -17755,7 +17755,7 @@
               </a:defRPr>
             </a:pPr>
             <a:r>
-              <a:t>In an emergency? </a:t>
+              <a:t>¿En caso de emergencia? </a:t>
             </a:r>
             <a:endParaRPr b="1" sz="1600">
               <a:solidFill>
@@ -17779,7 +17779,7 @@
               </a:defRPr>
             </a:pPr>
             <a:r>
-              <a:t>Type HELP for resources and contacts related to family violence, sexual violence, mental health, or other urgent situations.</a:t>
+              <a:t>Escribe y manda AYUDA para obtener recursos y contactos relacionados con violencia familiar, violencia sexual, la salud mental u otras situaciones urgentes.</a:t>
             </a:r>
             <a:endParaRPr b="1" sz="1600">
               <a:solidFill>
@@ -17921,7 +17921,7 @@
               </a:defRPr>
             </a:pPr>
             <a:r>
-              <a:t>Moving Forward</a:t>
+              <a:t>Más Adelante</a:t>
             </a:r>
             <a:endParaRPr b="0" i="0" sz="1400" u="none" cap="none" strike="noStrike">
               <a:solidFill>
@@ -17987,7 +17987,7 @@
               </a:defRPr>
             </a:pPr>
             <a:r>
-              <a:t>Let us set up some GROUND RULES</a:t>
+              <a:t>Establezcamos algunas REGLAS GENERALES</a:t>
             </a:r>
             <a:endParaRPr b="1" i="0" sz="5000" u="none" cap="none" strike="noStrike">
               <a:solidFill>
@@ -18469,7 +18469,7 @@
               </a:defRPr>
             </a:pPr>
             <a:r>
-              <a:t>Moving Forward</a:t>
+              <a:t>Más Adelante</a:t>
             </a:r>
             <a:endParaRPr b="1" i="0" sz="1400" u="none" cap="none" strike="noStrike">
               <a:solidFill>
@@ -18599,7 +18599,7 @@
               </a:defRPr>
             </a:pPr>
             <a:r>
-              <a:t>Throughout Crianza con Conciencia+, I will: </a:t>
+              <a:t>A lo largo de Crianza con Conciencia+, yo: </a:t>
             </a:r>
             <a:endParaRPr b="0" i="0" sz="1100" u="none" cap="none" strike="noStrike">
               <a:solidFill>
@@ -18635,7 +18635,7 @@
               </a:defRPr>
             </a:pPr>
             <a:r>
-              <a:t>Check in every few days till the end of the course</a:t>
+              <a:t>De vez en cuando y hasta que finalice el curso, saluda y pregunta cómo van</a:t>
             </a:r>
             <a:endParaRPr>
               <a:solidFill>
@@ -18667,7 +18667,7 @@
               </a:defRPr>
             </a:pPr>
             <a:r>
-              <a:t>Make sure all the you are following the ground rules discussed earlier </a:t>
+              <a:t>Asegúrate de que todos sigan las reglas generales que ya se discutieron </a:t>
             </a:r>
             <a:endParaRPr>
               <a:solidFill>
@@ -18699,7 +18699,7 @@
               </a:defRPr>
             </a:pPr>
             <a:r>
-              <a:t>Pose questions on parenting for discussion </a:t>
+              <a:t>Plantea preguntas sobre la crianza que puedan discutirse </a:t>
             </a:r>
             <a:endParaRPr>
               <a:solidFill>
@@ -18731,7 +18731,7 @@
               </a:defRPr>
             </a:pPr>
             <a:r>
-              <a:t>Report any case of abuse of girls, boys, adolescents, and adults.</a:t>
+              <a:t>Denuncia cualquier caso de abuso hacia niñas, niños, adolescentes y adultos.</a:t>
             </a:r>
             <a:endParaRPr>
               <a:solidFill>
@@ -18763,7 +18763,7 @@
               </a:defRPr>
             </a:pPr>
             <a:r>
-              <a:t>Leave once the programme is completed. However, you can continue learning through Crianza con Conciencia+. </a:t>
+              <a:t>Sal del grupo una vez terminado el programa. Sin embargo, puedes seguir aprendiendo a través de Crianza con Conciencia+. </a:t>
             </a:r>
             <a:endParaRPr>
               <a:solidFill>
@@ -18790,7 +18790,7 @@
               </a:defRPr>
             </a:pPr>
             <a:r>
-              <a:t>By the end of the year, there will be new courses on Crianza con Conciencia+. </a:t>
+              <a:t>A finales de año, habrá nuevos cursos de Crianza con Conciencia+. </a:t>
             </a:r>
             <a:endParaRPr b="1">
               <a:solidFill>
@@ -18932,7 +18932,7 @@
               </a:defRPr>
             </a:pPr>
             <a:r>
-              <a:t>Moving Forward</a:t>
+              <a:t>Más Adelante</a:t>
             </a:r>
             <a:endParaRPr b="0" i="0" sz="1400" u="none" cap="none" strike="noStrike">
               <a:solidFill>
@@ -19026,7 +19026,7 @@
               </a:defRPr>
             </a:pPr>
             <a:r>
-              <a:t>Do you have any questions about: </a:t>
+              <a:t>Tienes alguna pregunta sobre: </a:t>
             </a:r>
             <a:endParaRPr b="1" i="0" sz="1700" u="none" cap="none" strike="noStrike">
               <a:solidFill>
@@ -19068,7 +19068,7 @@
                 <a:cs typeface="Arial"/>
                 <a:sym typeface="Arial"/>
               </a:rPr>
-              <a:t>Using </a:t>
+              <a:t>Usar el </a:t>
             </a:r>
             <a:r>
               <a:t>Crianza con Conciencia+ chatbot</a:t>
@@ -19120,7 +19120,7 @@
               </a:defRPr>
             </a:pPr>
             <a:r>
-              <a:t>Participating in the WhatsApp Support Groups </a:t>
+              <a:t>Participar en los Grupos de Apoyo de WhatsApp </a:t>
             </a:r>
             <a:endParaRPr b="0" i="0" sz="1700" u="none" cap="none" strike="noStrike">
               <a:solidFill>
@@ -19156,7 +19156,7 @@
               </a:defRPr>
             </a:pPr>
             <a:r>
-              <a:t>Anything else?</a:t>
+              <a:t>¿Algo más?</a:t>
             </a:r>
             <a:r>
               <a:rPr>
@@ -19311,7 +19311,7 @@
               </a:defRPr>
             </a:pPr>
             <a:r>
-              <a:t>Moving Forward</a:t>
+              <a:t>Más Adelante</a:t>
             </a:r>
             <a:endParaRPr b="0" i="0" sz="1400" u="none" cap="none" strike="noStrike">
               <a:solidFill>
@@ -19373,7 +19373,7 @@
               </a:defRPr>
             </a:pPr>
             <a:r>
-              <a:t>Connecting to Formando Conciencia+</a:t>
+              <a:t>Conectarse a Formando Conciencia+</a:t>
             </a:r>
             <a:endParaRPr b="1" i="0" sz="5000" u="none" cap="none" strike="noStrike">
               <a:solidFill>
@@ -19800,7 +19800,7 @@
               </a:defRPr>
             </a:pPr>
             <a:r>
-              <a:t>WELCOME TO</a:t>
+              <a:t>TE DAMOS LA BIENVENIDA A</a:t>
             </a:r>
             <a:endParaRPr b="1" i="0" sz="4500" u="none" cap="none" strike="noStrike">
               <a:solidFill>
@@ -19974,7 +19974,7 @@
               </a:defRPr>
             </a:pPr>
             <a:r>
-              <a:t>Moving Forward</a:t>
+              <a:t>Más Adelante</a:t>
             </a:r>
             <a:endParaRPr b="0" i="0" sz="1400" u="none" cap="none" strike="noStrike">
               <a:solidFill>
@@ -20036,7 +20036,7 @@
               </a:defRPr>
             </a:pPr>
             <a:r>
-              <a:t>Share an </a:t>
+              <a:t>Comparte una </a:t>
             </a:r>
             <a:endParaRPr b="1" sz="5000">
               <a:solidFill>
@@ -20068,7 +20068,7 @@
               </a:defRPr>
             </a:pPr>
             <a:r>
-              <a:t>affirmation!</a:t>
+              <a:t>¡afirmación!</a:t>
             </a:r>
             <a:endParaRPr b="1" i="0" sz="5000" u="none" cap="none" strike="noStrike">
               <a:solidFill>
@@ -20556,7 +20556,7 @@
               </a:defRPr>
             </a:pPr>
             <a:r>
-              <a:t>Thank you</a:t>
+              <a:t>Gracias</a:t>
             </a:r>
             <a:br>
               <a:rPr b="1" i="0" lang="en-US" sz="2300" u="none" cap="none" strike="noStrike">
@@ -20581,7 +20581,7 @@
               </a:rPr>
             </a:br>
             <a:r>
-              <a:t>Any Questions?</a:t>
+              <a:t>¿Alguna pregunta?</a:t>
             </a:r>
             <a:endParaRPr b="0" i="0" sz="1900" u="none" cap="none" strike="noStrike">
               <a:solidFill>
@@ -20731,7 +20731,7 @@
               </a:defRPr>
             </a:pPr>
             <a:r>
-              <a:t>Welcome</a:t>
+              <a:t>Te damos la bienvenida a</a:t>
             </a:r>
             <a:endParaRPr b="0" i="0" sz="1400" u="none" cap="none" strike="noStrike">
               <a:solidFill>
@@ -20793,7 +20793,7 @@
               </a:defRPr>
             </a:pPr>
             <a:r>
-              <a:t>Let’s get to know </a:t>
+              <a:t>Vamos a conocer </a:t>
             </a:r>
             <a:endParaRPr b="1" sz="5000">
               <a:solidFill>
@@ -20825,7 +20825,7 @@
               </a:defRPr>
             </a:pPr>
             <a:r>
-              <a:t>each other </a:t>
+              <a:t>entre sí </a:t>
             </a:r>
             <a:endParaRPr b="1" i="0" sz="5000" u="none" cap="none" strike="noStrike">
               <a:solidFill>
@@ -21307,7 +21307,7 @@
               </a:defRPr>
             </a:pPr>
             <a:r>
-              <a:t>About Crianza con ConCiencia+</a:t>
+              <a:t>Sobre Crianza con Conciencia+</a:t>
             </a:r>
             <a:endParaRPr b="0" i="0" sz="1400" u="none" cap="none" strike="noStrike">
               <a:solidFill>
@@ -21380,7 +21380,7 @@
                   </a:ext>
                 </a:extLst>
               </a:rPr>
-              <a:t>Who is </a:t>
+              <a:t>¿A quién va dirigido </a:t>
             </a:r>
             <a:r>
               <a:rPr>
@@ -21390,7 +21390,7 @@
                   </a:ext>
                 </a:extLst>
               </a:rPr>
-              <a:t>Crianza con ConCiencia+</a:t>
+              <a:t>Crianza con Conciencia+</a:t>
             </a:r>
             <a:r>
               <a:rPr sz="1400">
@@ -21404,7 +21404,7 @@
                   </a:ext>
                 </a:extLst>
               </a:rPr>
-              <a:t> for? </a:t>
+              <a:t>? </a:t>
             </a:r>
             <a:endParaRPr b="0" i="0" sz="1400" u="none" cap="none" strike="noStrike">
               <a:solidFill>
@@ -21479,10 +21479,10 @@
                 <a:cs typeface="Arial"/>
                 <a:sym typeface="Arial"/>
               </a:rPr>
-              <a:t>For </a:t>
+              <a:t>Para </a:t>
             </a:r>
             <a:r>
-              <a:t>You</a:t>
+              <a:t>Ti</a:t>
             </a:r>
             <a:r>
               <a:rPr sz="1400">
@@ -21491,7 +21491,7 @@
                 <a:cs typeface="Arial"/>
                 <a:sym typeface="Arial"/>
               </a:rPr>
-              <a:t>, like you, with children 2 to </a:t>
+              <a:t>, personas como tú con niños, niñas y adolescentes de 2 a </a:t>
             </a:r>
             <a:r>
               <a:t>17</a:t>
@@ -21508,7 +21508,7 @@
                   </a:ext>
                 </a:extLst>
               </a:rPr>
-              <a:t> years old</a:t>
+              <a:t> años</a:t>
             </a:r>
             <a:r>
               <a:rPr sz="1400">
@@ -21554,7 +21554,7 @@
             </a:pPr>
             <a:r>
               <a:rPr b="1"/>
-              <a:t>You</a:t>
+              <a:t>Tú</a:t>
             </a:r>
             <a:r>
               <a:rPr b="1" sz="1400">
@@ -21572,7 +21572,7 @@
                 <a:cs typeface="Arial"/>
                 <a:sym typeface="Arial"/>
               </a:rPr>
-              <a:t>and </a:t>
+              <a:t>y la</a:t>
             </a:r>
             <a:r>
               <a:rPr b="1" sz="1400">
@@ -21581,7 +21581,7 @@
                 <a:cs typeface="Arial"/>
                 <a:sym typeface="Arial"/>
               </a:rPr>
-              <a:t>Parenting </a:t>
+              <a:t>Crianza </a:t>
             </a:r>
             <a:r>
               <a:rPr sz="1400">
@@ -21590,10 +21590,10 @@
                 <a:cs typeface="Arial"/>
                 <a:sym typeface="Arial"/>
               </a:rPr>
-              <a:t>includes all caregivers responsible for your child’s well-being. Caregivers include non-biological </a:t>
+              <a:t>incluye a todos los cuidadores que son responsables del bienestar de tu niño, niña o adolescente. Entre los cuidadores se incluyen personas que no tienen una relación biológica </a:t>
             </a:r>
             <a:r>
-              <a:t>You</a:t>
+              <a:t>Tú</a:t>
             </a:r>
             <a:r>
               <a:rPr sz="1400">
@@ -21602,10 +21602,10 @@
                 <a:cs typeface="Arial"/>
                 <a:sym typeface="Arial"/>
               </a:rPr>
-              <a:t> like aunts, uncles, siblings, cousins, foster </a:t>
+              <a:t> como tías, tíos, hermanos, hermanas, primos, primas, allegados </a:t>
             </a:r>
             <a:r>
-              <a:t>You</a:t>
+              <a:t>Tú</a:t>
             </a:r>
             <a:r>
               <a:rPr sz="1400">
@@ -21647,7 +21647,7 @@
               </a:defRPr>
             </a:pPr>
             <a:r>
-              <a:t>What is the goal of Crianza con Conciencia+? </a:t>
+              <a:t>¿Cuál es el objetivo de Crianza con Conciencia+? </a:t>
             </a:r>
             <a:endParaRPr b="1">
               <a:solidFill>
@@ -21706,7 +21706,7 @@
               </a:defRPr>
             </a:pPr>
             <a:r>
-              <a:t>Build open, caring, and trusting relationships between caregivers and children.</a:t>
+              <a:t>Construir relaciones llenas de cariño, transparencia y confianza entre los cuidadores y sus niños y niñas.</a:t>
             </a:r>
             <a:endParaRPr>
               <a:solidFill>
@@ -21744,7 +21744,7 @@
               </a:defRPr>
             </a:pPr>
             <a:r>
-              <a:t>Support healthy and positive relations to keep children safe and support their development.</a:t>
+              <a:t>Apoyar unas relaciones sanas y positivas para mantener a salvo a los niños y favorecer su desarrollo.</a:t>
             </a:r>
             <a:endParaRPr>
               <a:solidFill>
@@ -21935,7 +21935,7 @@
               </a:defRPr>
             </a:pPr>
             <a:r>
-              <a:t>About Crianza con ConCiencia+</a:t>
+              <a:t>Sobre Crianza con Conciencia+</a:t>
             </a:r>
             <a:endParaRPr sz="2400">
               <a:solidFill>
@@ -21985,7 +21985,7 @@
               </a:defRPr>
             </a:pPr>
             <a:r>
-              <a:t>Baseline Question</a:t>
+              <a:t>Pregunta de Referencia</a:t>
             </a:r>
             <a:endParaRPr sz="1100">
               <a:solidFill>
@@ -22200,7 +22200,7 @@
               </a:defRPr>
             </a:pPr>
             <a:r>
-              <a:t>In-person onboarding session</a:t>
+              <a:t>Sesión presencial de integración</a:t>
             </a:r>
             <a:endParaRPr b="1">
               <a:solidFill>
@@ -22288,7 +22288,7 @@
               </a:defRPr>
             </a:pPr>
             <a:r>
-              <a:t>Learning on Crianza con Conciencia+ chatbot </a:t>
+              <a:t>Aprendiendo en el chatbot de Crianza con Conciencia+ </a:t>
             </a:r>
             <a:endParaRPr b="1">
               <a:solidFill>
@@ -22397,7 +22397,7 @@
               </a:defRPr>
             </a:pPr>
             <a:r>
-              <a:t>Support &amp; Engagement on WhatsApp</a:t>
+              <a:t>Apoyo y Colaboración en WhatsApp</a:t>
             </a:r>
             <a:endParaRPr b="1">
               <a:solidFill>
@@ -22552,7 +22552,7 @@
               </a:defRPr>
             </a:pPr>
             <a:r>
-              <a:t>About Crianza con ConCiencia+</a:t>
+              <a:t>Sobre Crianza con Conciencia+</a:t>
             </a:r>
             <a:endParaRPr sz="2400">
               <a:solidFill>
@@ -22642,7 +22642,7 @@
               </a:defRPr>
             </a:pPr>
             <a:r>
-              <a:t>You will receive daily parenting tips via WhatsApp to help you with their relationship with you girl, boy, or teen (requiring only 5 minutes per day). You will receive 5 lessons on improving your relationship with their girl, boy, or teen: </a:t>
+              <a:t>Recibirás tips diarios sobre crianza por WhatsApp para ayudarte en la relación con tu niña, niño o adolescente (solo te tomará 5 minutos al día). Recibirás 5 sesiones sobre cómo mejorar la relación con tu niño, niña o adolescente: </a:t>
             </a:r>
             <a:endParaRPr sz="1300">
               <a:solidFill>
@@ -22673,7 +22673,7 @@
               </a:defRPr>
             </a:pPr>
             <a:r>
-              <a:t>Spend One-on-one Time with My Girl or Boy/Teen </a:t>
+              <a:t>Pasar Tiempo Uno a Uno con Mi Niña o Niño/Adolescente </a:t>
             </a:r>
             <a:endParaRPr sz="1300">
               <a:solidFill>
@@ -22704,7 +22704,7 @@
               </a:defRPr>
             </a:pPr>
             <a:r>
-              <a:t>Give Praise </a:t>
+              <a:t>Dar Reconocimiento y Halagar </a:t>
             </a:r>
             <a:endParaRPr sz="1300">
               <a:solidFill>
@@ -22735,7 +22735,7 @@
               </a:defRPr>
             </a:pPr>
             <a:r>
-              <a:t>Create a Routine for One-on-one Time </a:t>
+              <a:t>Crear una Rutina para el Tiempo Uno a Uno </a:t>
             </a:r>
             <a:endParaRPr sz="1300">
               <a:solidFill>
@@ -22766,7 +22766,7 @@
               </a:defRPr>
             </a:pPr>
             <a:r>
-              <a:t>Noticing Feelings During One-on-one Time </a:t>
+              <a:t>Identificar Emociones y Sentimientos durante el Tiempo Uno a Uno </a:t>
             </a:r>
             <a:endParaRPr sz="1300">
               <a:solidFill>
@@ -22797,7 +22797,7 @@
               </a:defRPr>
             </a:pPr>
             <a:r>
-              <a:t>Keeping Calm When We Are Stressed </a:t>
+              <a:t>Mantener la calma cuando hay estrés </a:t>
             </a:r>
             <a:endParaRPr sz="1300">
               <a:solidFill>
@@ -22824,7 +22824,7 @@
               </a:defRPr>
             </a:pPr>
             <a:r>
-              <a:t>At the end of the 5 days, you will receive a positive parenting certificate. </a:t>
+              <a:t>Al finalizar los 5 días, recibirás un certificado de crianza positiva. </a:t>
             </a:r>
             <a:endParaRPr sz="1500">
               <a:solidFill>
@@ -22945,7 +22945,7 @@
               </a:defRPr>
             </a:pPr>
             <a:r>
-              <a:t>Learning on Crianza con Conciencia+ chatbot </a:t>
+              <a:t>Aprendiendo en el chatbot de Crianza con Conciencia+ </a:t>
             </a:r>
             <a:endParaRPr b="1">
               <a:solidFill>
@@ -23111,7 +23111,7 @@
               </a:defRPr>
             </a:pPr>
             <a:r>
-              <a:t>About Crianza con ConCiencia+</a:t>
+              <a:t>Sobre Crianza con Conciencia+</a:t>
             </a:r>
             <a:endParaRPr sz="2400">
               <a:solidFill>
@@ -23201,7 +23201,7 @@
               </a:defRPr>
             </a:pPr>
             <a:r>
-              <a:t>You will participate in WhatsApp chat sessions to learn how to take care of your mental health to support yourself and your families. </a:t>
+              <a:t>Participarás en sesiones de chat de WhatsApp y aprenderás a cuidar de tu salud mental para apoyarte a ti mismo y a tus familias. </a:t>
             </a:r>
             <a:endParaRPr sz="1200">
               <a:solidFill>
@@ -23228,7 +23228,7 @@
               </a:defRPr>
             </a:pPr>
             <a:r>
-              <a:t>You can also share your experiences around the lessons offered via the Crianza con Conciencia+ chatbot. </a:t>
+              <a:t>También puedes compartir tus propias experiencias relacionadas con las sesiones ofrecidas a través del chatbot Crianza con Conciencia+. </a:t>
             </a:r>
             <a:endParaRPr sz="1200">
               <a:solidFill>
@@ -23255,7 +23255,7 @@
               </a:defRPr>
             </a:pPr>
             <a:r>
-              <a:t>There are three chat sessions: </a:t>
+              <a:t>Hay tres sesiones de chat: </a:t>
             </a:r>
             <a:endParaRPr sz="1200">
               <a:solidFill>
@@ -23286,7 +23286,7 @@
               </a:defRPr>
             </a:pPr>
             <a:r>
-              <a:t>After the onboarding session: Welcome and introductions</a:t>
+              <a:t>Después de la sesión de integración: Bienvenida y presentaciones</a:t>
             </a:r>
             <a:endParaRPr sz="1200">
               <a:solidFill>
@@ -23317,7 +23317,7 @@
               </a:defRPr>
             </a:pPr>
             <a:r>
-              <a:t>Day 3: Self-talk: WhatsApp Chat session on self-talk and stress</a:t>
+              <a:t>Día 3: Diálogo Interno: Sesión de chat de WhatsApp sobre el diálogo interno y el estrés</a:t>
             </a:r>
             <a:endParaRPr sz="1200">
               <a:solidFill>
@@ -23348,7 +23348,7 @@
               </a:defRPr>
             </a:pPr>
             <a:r>
-              <a:t>Day 4: Saying Goodbye </a:t>
+              <a:t>Día 4: Despedirse </a:t>
             </a:r>
             <a:endParaRPr sz="1200">
               <a:solidFill>
@@ -23474,7 +23474,7 @@
               </a:defRPr>
             </a:pPr>
             <a:r>
-              <a:t>Support &amp; Engagement on WhatsApp</a:t>
+              <a:t>Apoyo y Colaboración en WhatsApp</a:t>
             </a:r>
             <a:endParaRPr b="1">
               <a:solidFill>
@@ -23632,7 +23632,7 @@
               </a:defRPr>
             </a:pPr>
             <a:r>
-              <a:t>The Parent Journey </a:t>
+              <a:t>La Travesía de los Padres, Madres y Cuidadores</a:t>
             </a:r>
             <a:endParaRPr b="1" i="0" sz="1400" u="none" cap="none" strike="noStrike">
               <a:solidFill>
@@ -23690,7 +23690,7 @@
               </a:defRPr>
             </a:pPr>
             <a:r>
-              <a:t>Day 1</a:t>
+              <a:t>Día 1</a:t>
             </a:r>
             <a:endParaRPr>
               <a:solidFill>
@@ -23748,7 +23748,7 @@
               </a:defRPr>
             </a:pPr>
             <a:r>
-              <a:t>Day 2</a:t>
+              <a:t>Día 2</a:t>
             </a:r>
             <a:endParaRPr>
               <a:solidFill>
@@ -23806,7 +23806,7 @@
               </a:defRPr>
             </a:pPr>
             <a:r>
-              <a:t>Day 3</a:t>
+              <a:t>Día 3</a:t>
             </a:r>
             <a:endParaRPr>
               <a:solidFill>
@@ -23864,7 +23864,7 @@
               </a:defRPr>
             </a:pPr>
             <a:r>
-              <a:t>Day 4</a:t>
+              <a:t>Día 4</a:t>
             </a:r>
             <a:endParaRPr>
               <a:solidFill>
@@ -23922,7 +23922,7 @@
               </a:defRPr>
             </a:pPr>
             <a:r>
-              <a:t>Day 5</a:t>
+              <a:t>Día 5</a:t>
             </a:r>
             <a:endParaRPr>
               <a:solidFill>
@@ -24000,7 +24000,7 @@
             </a:pPr>
             <a:r>
               <a:rPr b="1"/>
-              <a:t>Lesson 1: </a:t>
+              <a:t>Sesión 1: </a:t>
             </a:r>
             <a:r>
               <a:t>Pasar tiempo uno a uno </a:t>
@@ -24049,7 +24049,7 @@
             </a:pPr>
             <a:r>
               <a:rPr b="1"/>
-              <a:t>Lesson 2: </a:t>
+              <a:t>Sesión 2: </a:t>
             </a:r>
             <a:r>
               <a:t>Dar reconocimiento </a:t>
@@ -24098,7 +24098,7 @@
             </a:pPr>
             <a:r>
               <a:rPr b="1"/>
-              <a:t>Lesson 3: </a:t>
+              <a:t>Sesión 3: </a:t>
             </a:r>
             <a:r>
               <a:t>Crear rutinas</a:t>
@@ -24147,7 +24147,7 @@
             </a:pPr>
             <a:r>
               <a:rPr b="1"/>
-              <a:t>Lesson 4: </a:t>
+              <a:t>Sesión 4: </a:t>
             </a:r>
             <a:r>
               <a:t>Identificar emociones </a:t>
@@ -24196,14 +24196,14 @@
             </a:pPr>
             <a:r>
               <a:rPr b="1"/>
-              <a:t>Lesson 5: </a:t>
+              <a:t>Sesión 5: </a:t>
             </a:r>
             <a:r>
               <a:t>Mantener la calma cuando hay estrés </a:t>
             </a:r>
             <a:r>
               <a:rPr i="1"/>
-              <a:t>+ Certificate</a:t>
+              <a:t>+ Certificado</a:t>
             </a:r>
             <a:endParaRPr i="1"/>
           </a:p>
@@ -24249,7 +24249,7 @@
               </a:defRPr>
             </a:pPr>
             <a:r>
-              <a:t>Self-talk</a:t>
+              <a:t>Diálogo Interno</a:t>
             </a:r>
           </a:p>
         </p:txBody>
@@ -24294,7 +24294,7 @@
               </a:defRPr>
             </a:pPr>
             <a:r>
-              <a:t>Closing</a:t>
+              <a:t>Cierre</a:t>
             </a:r>
           </a:p>
         </p:txBody>
@@ -24339,7 +24339,7 @@
               </a:defRPr>
             </a:pPr>
             <a:r>
-              <a:t>Onboarding + Digital Literacy Training</a:t>
+              <a:t>Integración + Formación en Alfabetización Digital</a:t>
             </a:r>
           </a:p>
         </p:txBody>
@@ -24384,7 +24384,7 @@
               </a:defRPr>
             </a:pPr>
             <a:r>
-              <a:t>In-Person Session with Facilitator</a:t>
+              <a:t>Sesión Presencial con el Facilitador</a:t>
             </a:r>
           </a:p>
         </p:txBody>
@@ -24429,11 +24429,11 @@
               </a:defRPr>
             </a:pPr>
             <a:r>
-              <a:t>Remote learning via </a:t>
+              <a:t>Aprendizaje a distancia a través de </a:t>
             </a:r>
             <a:r>
               <a:rPr b="1"/>
-              <a:t>Crianza con Conciencia</a:t>
+              <a:t>Crianza con Conciencia+</a:t>
             </a:r>
             <a:endParaRPr b="1"/>
           </a:p>
@@ -24479,7 +24479,7 @@
               </a:defRPr>
             </a:pPr>
             <a:r>
-              <a:t>WhatsApp chat groups with Facilitator </a:t>
+              <a:t>Grupos de chat de WhatsApp con el Facilitador </a:t>
             </a:r>
           </a:p>
         </p:txBody>
@@ -25702,10 +25702,10 @@
                 <a:cs typeface="Arial"/>
                 <a:sym typeface="Arial"/>
               </a:rPr>
-              <a:t>Getting Started with </a:t>
+              <a:t>Primeros pasos para el chatbot de </a:t>
             </a:r>
             <a:r>
-              <a:t>Crianza con Conciencia+ chatbot</a:t>
+              <a:t>Crianza con Conciencia+</a:t>
             </a:r>
             <a:endParaRPr b="0" i="0" sz="1400" u="none" cap="none" strike="noStrike">
               <a:solidFill>
@@ -25771,7 +25771,7 @@
               </a:defRPr>
             </a:pPr>
             <a:r>
-              <a:t>Phone Use </a:t>
+              <a:t>Uso del teléfono </a:t>
             </a:r>
             <a:endParaRPr b="0" i="0" sz="1800" u="none" cap="none" strike="noStrike">
               <a:solidFill>
@@ -25839,7 +25839,7 @@
               </a:defRPr>
             </a:pPr>
             <a:r>
-              <a:t>Switch on and off the phone </a:t>
+              <a:t>Prender y apagar el teléfono </a:t>
             </a:r>
             <a:endParaRPr b="0" i="0" sz="1700" u="none" cap="none" strike="noStrike">
               <a:solidFill>
@@ -25879,7 +25879,7 @@
               </a:defRPr>
             </a:pPr>
             <a:r>
-              <a:t>Phone settings </a:t>
+              <a:t>Ajustes del teléfono </a:t>
             </a:r>
             <a:endParaRPr b="0" i="0" sz="1700" u="none" cap="none" strike="noStrike">
               <a:solidFill>
@@ -25919,7 +25919,7 @@
               </a:defRPr>
             </a:pPr>
             <a:r>
-              <a:t>WhatsApp settings </a:t>
+              <a:t>Ajustes de WhatsApp </a:t>
             </a:r>
             <a:endParaRPr b="0" i="0" sz="1700" u="none" cap="none" strike="noStrike">
               <a:solidFill>
@@ -25959,7 +25959,7 @@
               </a:defRPr>
             </a:pPr>
             <a:r>
-              <a:t>Phone charging </a:t>
+              <a:t>Carga del teléfono </a:t>
             </a:r>
             <a:endParaRPr b="0" i="0" sz="1700" u="none" cap="none" strike="noStrike">
               <a:solidFill>
@@ -25999,7 +25999,7 @@
               </a:defRPr>
             </a:pPr>
             <a:r>
-              <a:t>Data bundle</a:t>
+              <a:t>Paquete de datos</a:t>
             </a:r>
             <a:endParaRPr b="0" i="0" sz="1700" u="none" cap="none" strike="noStrike">
               <a:solidFill>
@@ -26039,7 +26039,7 @@
               </a:defRPr>
             </a:pPr>
             <a:r>
-              <a:t>Internal phone storage </a:t>
+              <a:t>Almacenamiento interno del teléfono </a:t>
             </a:r>
             <a:endParaRPr b="0" i="0" sz="1700" u="none" cap="none" strike="noStrike">
               <a:solidFill>
@@ -26079,7 +26079,7 @@
               </a:defRPr>
             </a:pPr>
             <a:r>
-              <a:t>Digital awareness </a:t>
+              <a:t>Conciencia digital </a:t>
             </a:r>
             <a:endParaRPr b="0" i="0" sz="1700" u="none" cap="none" strike="noStrike">
               <a:solidFill>
@@ -26119,7 +26119,7 @@
               </a:defRPr>
             </a:pPr>
             <a:r>
-              <a:t>Prevent damage to the phone</a:t>
+              <a:t>Evita daños al teléfono</a:t>
             </a:r>
             <a:endParaRPr b="0" i="0" sz="1700" u="none" cap="none" strike="noStrike">
               <a:solidFill>

</xml_diff>